<commit_message>
Exemplos menu e window - atualização da apresentação
</commit_message>
<xml_diff>
--- a/apresentacao.pptx
+++ b/apresentacao.pptx
@@ -5,7 +5,7 @@
     <p:sldMasterId id="2147483660" r:id="rId1"/>
   </p:sldMasterIdLst>
   <p:notesMasterIdLst>
-    <p:notesMasterId r:id="rId33"/>
+    <p:notesMasterId r:id="rId39"/>
   </p:notesMasterIdLst>
   <p:sldIdLst>
     <p:sldId id="256" r:id="rId2"/>
@@ -38,7 +38,13 @@
     <p:sldId id="285" r:id="rId29"/>
     <p:sldId id="286" r:id="rId30"/>
     <p:sldId id="287" r:id="rId31"/>
-    <p:sldId id="288" r:id="rId32"/>
+    <p:sldId id="291" r:id="rId32"/>
+    <p:sldId id="288" r:id="rId33"/>
+    <p:sldId id="289" r:id="rId34"/>
+    <p:sldId id="290" r:id="rId35"/>
+    <p:sldId id="292" r:id="rId36"/>
+    <p:sldId id="293" r:id="rId37"/>
+    <p:sldId id="294" r:id="rId38"/>
   </p:sldIdLst>
   <p:sldSz cx="9144000" cy="6858000" type="screen4x3"/>
   <p:notesSz cx="6858000" cy="9144000"/>
@@ -139,7 +145,7 @@
   </p:defaultTextStyle>
   <p:extLst>
     <p:ext uri="{EFAFB233-063F-42B5-8137-9DF3F51BA10A}">
-      <p15:sldGuideLst xmlns:p15="http://schemas.microsoft.com/office/powerpoint/2012/main">
+      <p15:sldGuideLst xmlns:p15="http://schemas.microsoft.com/office/powerpoint/2012/main" xmlns="">
         <p15:guide id="1" orient="horz" pos="2160">
           <p15:clr>
             <a:srgbClr val="A4A3A4"/>
@@ -238,7 +244,7 @@
           <a:p>
             <a:fld id="{EEEE0CAD-A63B-4B96-BCE8-8E2E459536ED}" type="datetimeFigureOut">
               <a:rPr lang="pt-BR" smtClean="0"/>
-              <a:t>19/10/2015</a:t>
+              <a:t>20/10/2015</a:t>
             </a:fld>
             <a:endParaRPr lang="pt-BR"/>
           </a:p>
@@ -687,7 +693,7 @@
           <a:p>
             <a:fld id="{10F10ABD-E206-4B11-B2C8-1EFC8398F80C}" type="datetimeFigureOut">
               <a:rPr lang="pt-BR" smtClean="0"/>
-              <a:t>19/10/2015</a:t>
+              <a:t>20/10/2015</a:t>
             </a:fld>
             <a:endParaRPr lang="pt-BR"/>
           </a:p>
@@ -869,7 +875,7 @@
           <a:p>
             <a:fld id="{10F10ABD-E206-4B11-B2C8-1EFC8398F80C}" type="datetimeFigureOut">
               <a:rPr lang="pt-BR" smtClean="0"/>
-              <a:t>19/10/2015</a:t>
+              <a:t>20/10/2015</a:t>
             </a:fld>
             <a:endParaRPr lang="pt-BR"/>
           </a:p>
@@ -1061,7 +1067,7 @@
           <a:p>
             <a:fld id="{10F10ABD-E206-4B11-B2C8-1EFC8398F80C}" type="datetimeFigureOut">
               <a:rPr lang="pt-BR" smtClean="0"/>
-              <a:t>19/10/2015</a:t>
+              <a:t>20/10/2015</a:t>
             </a:fld>
             <a:endParaRPr lang="pt-BR"/>
           </a:p>
@@ -1243,7 +1249,7 @@
           <a:p>
             <a:fld id="{10F10ABD-E206-4B11-B2C8-1EFC8398F80C}" type="datetimeFigureOut">
               <a:rPr lang="pt-BR" smtClean="0"/>
-              <a:t>19/10/2015</a:t>
+              <a:t>20/10/2015</a:t>
             </a:fld>
             <a:endParaRPr lang="pt-BR"/>
           </a:p>
@@ -1501,7 +1507,7 @@
           <a:p>
             <a:fld id="{10F10ABD-E206-4B11-B2C8-1EFC8398F80C}" type="datetimeFigureOut">
               <a:rPr lang="pt-BR" smtClean="0"/>
-              <a:t>19/10/2015</a:t>
+              <a:t>20/10/2015</a:t>
             </a:fld>
             <a:endParaRPr lang="pt-BR"/>
           </a:p>
@@ -1801,7 +1807,7 @@
           <a:p>
             <a:fld id="{10F10ABD-E206-4B11-B2C8-1EFC8398F80C}" type="datetimeFigureOut">
               <a:rPr lang="pt-BR" smtClean="0"/>
-              <a:t>19/10/2015</a:t>
+              <a:t>20/10/2015</a:t>
             </a:fld>
             <a:endParaRPr lang="pt-BR"/>
           </a:p>
@@ -2235,7 +2241,7 @@
           <a:p>
             <a:fld id="{10F10ABD-E206-4B11-B2C8-1EFC8398F80C}" type="datetimeFigureOut">
               <a:rPr lang="pt-BR" smtClean="0"/>
-              <a:t>19/10/2015</a:t>
+              <a:t>20/10/2015</a:t>
             </a:fld>
             <a:endParaRPr lang="pt-BR"/>
           </a:p>
@@ -2365,7 +2371,7 @@
           <a:p>
             <a:fld id="{10F10ABD-E206-4B11-B2C8-1EFC8398F80C}" type="datetimeFigureOut">
               <a:rPr lang="pt-BR" smtClean="0"/>
-              <a:t>19/10/2015</a:t>
+              <a:t>20/10/2015</a:t>
             </a:fld>
             <a:endParaRPr lang="pt-BR"/>
           </a:p>
@@ -2472,7 +2478,7 @@
           <a:p>
             <a:fld id="{10F10ABD-E206-4B11-B2C8-1EFC8398F80C}" type="datetimeFigureOut">
               <a:rPr lang="pt-BR" smtClean="0"/>
-              <a:t>19/10/2015</a:t>
+              <a:t>20/10/2015</a:t>
             </a:fld>
             <a:endParaRPr lang="pt-BR"/>
           </a:p>
@@ -2761,7 +2767,7 @@
           <a:p>
             <a:fld id="{10F10ABD-E206-4B11-B2C8-1EFC8398F80C}" type="datetimeFigureOut">
               <a:rPr lang="pt-BR" smtClean="0"/>
-              <a:t>19/10/2015</a:t>
+              <a:t>20/10/2015</a:t>
             </a:fld>
             <a:endParaRPr lang="pt-BR"/>
           </a:p>
@@ -3030,7 +3036,7 @@
           <a:p>
             <a:fld id="{10F10ABD-E206-4B11-B2C8-1EFC8398F80C}" type="datetimeFigureOut">
               <a:rPr lang="pt-BR" smtClean="0"/>
-              <a:t>19/10/2015</a:t>
+              <a:t>20/10/2015</a:t>
             </a:fld>
             <a:endParaRPr lang="pt-BR"/>
           </a:p>
@@ -3260,7 +3266,7 @@
           <a:p>
             <a:fld id="{10F10ABD-E206-4B11-B2C8-1EFC8398F80C}" type="datetimeFigureOut">
               <a:rPr lang="pt-BR" smtClean="0"/>
-              <a:t>19/10/2015</a:t>
+              <a:t>20/10/2015</a:t>
             </a:fld>
             <a:endParaRPr lang="pt-BR"/>
           </a:p>
@@ -7173,18 +7179,25 @@
   <p:clrMapOvr>
     <a:masterClrMapping/>
   </p:clrMapOvr>
-  <mc:AlternateContent xmlns:mc="http://schemas.openxmlformats.org/markup-compatibility/2006">
-    <mc:Choice xmlns:p14="http://schemas.microsoft.com/office/powerpoint/2010/main" Requires="p14">
+  <mc:AlternateContent xmlns:mc="http://schemas.openxmlformats.org/markup-compatibility/2006" xmlns:p14="http://schemas.microsoft.com/office/powerpoint/2010/main">
+    <mc:Choice Requires="p14">
       <p:transition spd="slow" p14:dur="1500">
         <p14:honeycomb/>
       </p:transition>
     </mc:Choice>
-    <mc:Fallback>
+    <mc:Fallback xmlns="">
       <p:transition spd="slow">
         <p:fade/>
       </p:transition>
     </mc:Fallback>
   </mc:AlternateContent>
+  <p:timing>
+    <p:tnLst>
+      <p:par>
+        <p:cTn id="1" dur="indefinite" restart="never" nodeType="tmRoot"/>
+      </p:par>
+    </p:tnLst>
+  </p:timing>
 </p:sld>
 </file>
 
@@ -7226,7 +7239,7 @@
                   <a:schemeClr val="bg1"/>
                 </a:solidFill>
               </a:rPr>
-              <a:t>Window</a:t>
+              <a:t>App</a:t>
             </a:r>
             <a:endParaRPr lang="pt-BR" dirty="0">
               <a:solidFill>
@@ -7251,10 +7264,227 @@
           <a:bodyPr/>
           <a:lstStyle/>
           <a:p>
-            <a:endParaRPr lang="pt-BR" u="sng" dirty="0"/>
-          </a:p>
-        </p:txBody>
-      </p:sp>
+            <a:endParaRPr lang="pt-BR" dirty="0"/>
+          </a:p>
+        </p:txBody>
+      </p:sp>
+      <p:pic>
+        <p:nvPicPr>
+          <p:cNvPr id="4098" name="Picture 2" descr="C:\Users\CRA-DTI-02\Desktop\Sem título-5.fw.png"/>
+          <p:cNvPicPr>
+            <a:picLocks noChangeAspect="1" noChangeArrowheads="1"/>
+          </p:cNvPicPr>
+          <p:nvPr/>
+        </p:nvPicPr>
+        <p:blipFill>
+          <a:blip r:embed="rId2">
+            <a:extLst>
+              <a:ext uri="{28A0092B-C50C-407E-A947-70E740481C1C}">
+                <a14:useLocalDpi xmlns:a14="http://schemas.microsoft.com/office/drawing/2010/main" val="0"/>
+              </a:ext>
+            </a:extLst>
+          </a:blip>
+          <a:srcRect/>
+          <a:stretch>
+            <a:fillRect/>
+          </a:stretch>
+        </p:blipFill>
+        <p:spPr bwMode="auto">
+          <a:xfrm>
+            <a:off x="1619672" y="2532608"/>
+            <a:ext cx="5995988" cy="2768600"/>
+          </a:xfrm>
+          <a:prstGeom prst="rect">
+            <a:avLst/>
+          </a:prstGeom>
+          <a:noFill/>
+          <a:extLst>
+            <a:ext uri="{909E8E84-426E-40DD-AFC4-6F175D3DCCD1}">
+              <a14:hiddenFill xmlns:a14="http://schemas.microsoft.com/office/drawing/2010/main">
+                <a:solidFill>
+                  <a:srgbClr val="FFFFFF"/>
+                </a:solidFill>
+              </a14:hiddenFill>
+            </a:ext>
+          </a:extLst>
+        </p:spPr>
+      </p:pic>
+    </p:spTree>
+    <p:extLst>
+      <p:ext uri="{BB962C8B-B14F-4D97-AF65-F5344CB8AC3E}">
+        <p14:creationId xmlns:p14="http://schemas.microsoft.com/office/powerpoint/2010/main" val="2640984379"/>
+      </p:ext>
+    </p:extLst>
+  </p:cSld>
+  <p:clrMapOvr>
+    <a:masterClrMapping/>
+  </p:clrMapOvr>
+  <mc:AlternateContent xmlns:mc="http://schemas.openxmlformats.org/markup-compatibility/2006" xmlns:p14="http://schemas.microsoft.com/office/powerpoint/2010/main">
+    <mc:Choice Requires="p14">
+      <p:transition spd="slow" p14:dur="1500">
+        <p14:honeycomb/>
+      </p:transition>
+    </mc:Choice>
+    <mc:Fallback xmlns="">
+      <p:transition spd="slow">
+        <p:fade/>
+      </p:transition>
+    </mc:Fallback>
+  </mc:AlternateContent>
+  <p:timing>
+    <p:tnLst>
+      <p:par>
+        <p:cTn id="1" dur="indefinite" restart="never" nodeType="tmRoot"/>
+      </p:par>
+    </p:tnLst>
+  </p:timing>
+</p:sld>
+</file>
+
+<file path=ppt/slides/slide32.xml><?xml version="1.0" encoding="utf-8"?>
+<p:sld xmlns:a="http://schemas.openxmlformats.org/drawingml/2006/main" xmlns:r="http://schemas.openxmlformats.org/officeDocument/2006/relationships" xmlns:p="http://schemas.openxmlformats.org/presentationml/2006/main">
+  <p:cSld>
+    <p:spTree>
+      <p:nvGrpSpPr>
+        <p:cNvPr id="1" name=""/>
+        <p:cNvGrpSpPr/>
+        <p:nvPr/>
+      </p:nvGrpSpPr>
+      <p:grpSpPr>
+        <a:xfrm>
+          <a:off x="0" y="0"/>
+          <a:ext cx="0" cy="0"/>
+          <a:chOff x="0" y="0"/>
+          <a:chExt cx="0" cy="0"/>
+        </a:xfrm>
+      </p:grpSpPr>
+      <p:sp>
+        <p:nvSpPr>
+          <p:cNvPr id="2" name="Título 1"/>
+          <p:cNvSpPr>
+            <a:spLocks noGrp="1"/>
+          </p:cNvSpPr>
+          <p:nvPr>
+            <p:ph type="title"/>
+          </p:nvPr>
+        </p:nvSpPr>
+        <p:spPr/>
+        <p:txBody>
+          <a:bodyPr/>
+          <a:lstStyle/>
+          <a:p>
+            <a:r>
+              <a:rPr lang="pt-BR" dirty="0" err="1" smtClean="0">
+                <a:solidFill>
+                  <a:schemeClr val="bg1"/>
+                </a:solidFill>
+              </a:rPr>
+              <a:t>Window</a:t>
+            </a:r>
+            <a:endParaRPr lang="pt-BR" dirty="0">
+              <a:solidFill>
+                <a:schemeClr val="bg1"/>
+              </a:solidFill>
+            </a:endParaRPr>
+          </a:p>
+        </p:txBody>
+      </p:sp>
+      <p:sp>
+        <p:nvSpPr>
+          <p:cNvPr id="3" name="Espaço Reservado para Conteúdo 2"/>
+          <p:cNvSpPr>
+            <a:spLocks noGrp="1"/>
+          </p:cNvSpPr>
+          <p:nvPr>
+            <p:ph idx="1"/>
+          </p:nvPr>
+        </p:nvSpPr>
+        <p:spPr/>
+        <p:txBody>
+          <a:bodyPr/>
+          <a:lstStyle/>
+          <a:p>
+            <a:r>
+              <a:rPr lang="pt-BR" dirty="0" smtClean="0">
+                <a:solidFill>
+                  <a:schemeClr val="bg1"/>
+                </a:solidFill>
+              </a:rPr>
+              <a:t>É a jan</a:t>
+            </a:r>
+            <a:r>
+              <a:rPr lang="pt-BR" dirty="0" smtClean="0">
+                <a:solidFill>
+                  <a:schemeClr val="bg1"/>
+                </a:solidFill>
+              </a:rPr>
+              <a:t>ela do </a:t>
+            </a:r>
+            <a:r>
+              <a:rPr lang="pt-BR" dirty="0" err="1" smtClean="0">
+                <a:solidFill>
+                  <a:schemeClr val="bg1"/>
+                </a:solidFill>
+              </a:rPr>
+              <a:t>nwjs</a:t>
+            </a:r>
+            <a:r>
+              <a:rPr lang="pt-BR" dirty="0" smtClean="0">
+                <a:solidFill>
+                  <a:schemeClr val="bg1"/>
+                </a:solidFill>
+              </a:rPr>
+              <a:t> (obviamente), que contém várias operações e eventos.</a:t>
+            </a:r>
+            <a:endParaRPr lang="pt-BR" dirty="0">
+              <a:solidFill>
+                <a:schemeClr val="bg1"/>
+              </a:solidFill>
+            </a:endParaRPr>
+          </a:p>
+        </p:txBody>
+      </p:sp>
+      <p:pic>
+        <p:nvPicPr>
+          <p:cNvPr id="1026" name="Picture 2" descr="C:\Users\CRA-DTI-02\Desktop\Sem título-2.fw.png"/>
+          <p:cNvPicPr>
+            <a:picLocks noChangeAspect="1" noChangeArrowheads="1"/>
+          </p:cNvPicPr>
+          <p:nvPr/>
+        </p:nvPicPr>
+        <p:blipFill>
+          <a:blip r:embed="rId2">
+            <a:extLst>
+              <a:ext uri="{28A0092B-C50C-407E-A947-70E740481C1C}">
+                <a14:useLocalDpi xmlns:a14="http://schemas.microsoft.com/office/drawing/2010/main" val="0"/>
+              </a:ext>
+            </a:extLst>
+          </a:blip>
+          <a:srcRect/>
+          <a:stretch>
+            <a:fillRect/>
+          </a:stretch>
+        </p:blipFill>
+        <p:spPr bwMode="auto">
+          <a:xfrm>
+            <a:off x="5729" y="2708920"/>
+            <a:ext cx="9138271" cy="1409700"/>
+          </a:xfrm>
+          <a:prstGeom prst="rect">
+            <a:avLst/>
+          </a:prstGeom>
+          <a:noFill/>
+          <a:extLst>
+            <a:ext uri="{909E8E84-426E-40DD-AFC4-6F175D3DCCD1}">
+              <a14:hiddenFill xmlns:a14="http://schemas.microsoft.com/office/drawing/2010/main">
+                <a:solidFill>
+                  <a:srgbClr val="FFFFFF"/>
+                </a:solidFill>
+              </a14:hiddenFill>
+            </a:ext>
+          </a:extLst>
+        </p:spPr>
+      </p:pic>
     </p:spTree>
     <p:extLst>
       <p:ext uri="{BB962C8B-B14F-4D97-AF65-F5344CB8AC3E}">
@@ -7265,18 +7495,1208 @@
   <p:clrMapOvr>
     <a:masterClrMapping/>
   </p:clrMapOvr>
-  <mc:AlternateContent xmlns:mc="http://schemas.openxmlformats.org/markup-compatibility/2006">
-    <mc:Choice xmlns:p14="http://schemas.microsoft.com/office/powerpoint/2010/main" Requires="p14">
+  <mc:AlternateContent xmlns:mc="http://schemas.openxmlformats.org/markup-compatibility/2006" xmlns:p14="http://schemas.microsoft.com/office/powerpoint/2010/main">
+    <mc:Choice Requires="p14">
       <p:transition spd="slow" p14:dur="1500">
         <p14:honeycomb/>
       </p:transition>
     </mc:Choice>
-    <mc:Fallback>
+    <mc:Fallback xmlns="">
       <p:transition spd="slow">
         <p:fade/>
       </p:transition>
     </mc:Fallback>
   </mc:AlternateContent>
+  <p:timing>
+    <p:tnLst>
+      <p:par>
+        <p:cTn id="1" dur="indefinite" restart="never" nodeType="tmRoot"/>
+      </p:par>
+    </p:tnLst>
+  </p:timing>
+</p:sld>
+</file>
+
+<file path=ppt/slides/slide33.xml><?xml version="1.0" encoding="utf-8"?>
+<p:sld xmlns:a="http://schemas.openxmlformats.org/drawingml/2006/main" xmlns:r="http://schemas.openxmlformats.org/officeDocument/2006/relationships" xmlns:p="http://schemas.openxmlformats.org/presentationml/2006/main">
+  <p:cSld>
+    <p:spTree>
+      <p:nvGrpSpPr>
+        <p:cNvPr id="1" name=""/>
+        <p:cNvGrpSpPr/>
+        <p:nvPr/>
+      </p:nvGrpSpPr>
+      <p:grpSpPr>
+        <a:xfrm>
+          <a:off x="0" y="0"/>
+          <a:ext cx="0" cy="0"/>
+          <a:chOff x="0" y="0"/>
+          <a:chExt cx="0" cy="0"/>
+        </a:xfrm>
+      </p:grpSpPr>
+      <p:sp>
+        <p:nvSpPr>
+          <p:cNvPr id="2" name="Título 1"/>
+          <p:cNvSpPr>
+            <a:spLocks noGrp="1"/>
+          </p:cNvSpPr>
+          <p:nvPr>
+            <p:ph type="title"/>
+          </p:nvPr>
+        </p:nvSpPr>
+        <p:spPr/>
+        <p:txBody>
+          <a:bodyPr/>
+          <a:lstStyle/>
+          <a:p>
+            <a:r>
+              <a:rPr lang="pt-BR" dirty="0" err="1" smtClean="0">
+                <a:solidFill>
+                  <a:schemeClr val="bg1"/>
+                </a:solidFill>
+              </a:rPr>
+              <a:t>Window</a:t>
+            </a:r>
+            <a:r>
+              <a:rPr lang="pt-BR" dirty="0" smtClean="0">
+                <a:solidFill>
+                  <a:schemeClr val="bg1"/>
+                </a:solidFill>
+              </a:rPr>
+              <a:t> </a:t>
+            </a:r>
+            <a:r>
+              <a:rPr lang="pt-BR" dirty="0" err="1" smtClean="0">
+                <a:solidFill>
+                  <a:schemeClr val="bg1"/>
+                </a:solidFill>
+              </a:rPr>
+              <a:t>events</a:t>
+            </a:r>
+            <a:endParaRPr lang="pt-BR" dirty="0">
+              <a:solidFill>
+                <a:schemeClr val="bg1"/>
+              </a:solidFill>
+            </a:endParaRPr>
+          </a:p>
+        </p:txBody>
+      </p:sp>
+      <p:sp>
+        <p:nvSpPr>
+          <p:cNvPr id="3" name="Espaço Reservado para Conteúdo 2"/>
+          <p:cNvSpPr>
+            <a:spLocks noGrp="1"/>
+          </p:cNvSpPr>
+          <p:nvPr>
+            <p:ph idx="1"/>
+          </p:nvPr>
+        </p:nvSpPr>
+        <p:spPr/>
+        <p:txBody>
+          <a:bodyPr/>
+          <a:lstStyle/>
+          <a:p>
+            <a:r>
+              <a:rPr lang="pt-BR" dirty="0" smtClean="0">
+                <a:solidFill>
+                  <a:schemeClr val="bg1"/>
+                </a:solidFill>
+              </a:rPr>
+              <a:t>Minimize, </a:t>
+            </a:r>
+            <a:r>
+              <a:rPr lang="pt-BR" dirty="0" err="1" smtClean="0">
+                <a:solidFill>
+                  <a:schemeClr val="bg1"/>
+                </a:solidFill>
+              </a:rPr>
+              <a:t>maximeze</a:t>
+            </a:r>
+            <a:r>
+              <a:rPr lang="pt-BR" dirty="0" smtClean="0">
+                <a:solidFill>
+                  <a:schemeClr val="bg1"/>
+                </a:solidFill>
+              </a:rPr>
+              <a:t>, close, </a:t>
+            </a:r>
+            <a:r>
+              <a:rPr lang="pt-BR" dirty="0" err="1" smtClean="0">
+                <a:solidFill>
+                  <a:schemeClr val="bg1"/>
+                </a:solidFill>
+              </a:rPr>
+              <a:t>closed</a:t>
+            </a:r>
+            <a:r>
+              <a:rPr lang="pt-BR" dirty="0" smtClean="0">
+                <a:solidFill>
+                  <a:schemeClr val="bg1"/>
+                </a:solidFill>
+              </a:rPr>
+              <a:t>, </a:t>
+            </a:r>
+            <a:r>
+              <a:rPr lang="pt-BR" dirty="0" err="1" smtClean="0">
+                <a:solidFill>
+                  <a:schemeClr val="bg1"/>
+                </a:solidFill>
+              </a:rPr>
+              <a:t>resize</a:t>
+            </a:r>
+            <a:r>
+              <a:rPr lang="pt-BR" dirty="0" smtClean="0">
+                <a:solidFill>
+                  <a:schemeClr val="bg1"/>
+                </a:solidFill>
+              </a:rPr>
+              <a:t>, </a:t>
+            </a:r>
+            <a:r>
+              <a:rPr lang="pt-BR" dirty="0" err="1" smtClean="0">
+                <a:solidFill>
+                  <a:schemeClr val="bg1"/>
+                </a:solidFill>
+              </a:rPr>
+              <a:t>focus</a:t>
+            </a:r>
+            <a:r>
+              <a:rPr lang="pt-BR" dirty="0" smtClean="0">
+                <a:solidFill>
+                  <a:schemeClr val="bg1"/>
+                </a:solidFill>
+              </a:rPr>
+              <a:t>, </a:t>
+            </a:r>
+            <a:r>
+              <a:rPr lang="pt-BR" dirty="0" err="1" smtClean="0">
+                <a:solidFill>
+                  <a:schemeClr val="bg1"/>
+                </a:solidFill>
+              </a:rPr>
+              <a:t>loaded</a:t>
+            </a:r>
+            <a:r>
+              <a:rPr lang="pt-BR" dirty="0" smtClean="0">
+                <a:solidFill>
+                  <a:schemeClr val="bg1"/>
+                </a:solidFill>
+              </a:rPr>
+              <a:t>, </a:t>
+            </a:r>
+            <a:r>
+              <a:rPr lang="pt-BR" dirty="0" err="1" smtClean="0">
+                <a:solidFill>
+                  <a:schemeClr val="bg1"/>
+                </a:solidFill>
+              </a:rPr>
+              <a:t>loading</a:t>
+            </a:r>
+            <a:r>
+              <a:rPr lang="pt-BR" dirty="0" smtClean="0">
+                <a:solidFill>
+                  <a:schemeClr val="bg1"/>
+                </a:solidFill>
+              </a:rPr>
+              <a:t>, </a:t>
+            </a:r>
+            <a:r>
+              <a:rPr lang="pt-BR" dirty="0" err="1" smtClean="0">
+                <a:solidFill>
+                  <a:schemeClr val="bg1"/>
+                </a:solidFill>
+              </a:rPr>
+              <a:t>restore</a:t>
+            </a:r>
+            <a:r>
+              <a:rPr lang="pt-BR" dirty="0" smtClean="0">
+                <a:solidFill>
+                  <a:schemeClr val="bg1"/>
+                </a:solidFill>
+              </a:rPr>
+              <a:t>, </a:t>
+            </a:r>
+            <a:r>
+              <a:rPr lang="pt-BR" dirty="0" err="1" smtClean="0">
+                <a:solidFill>
+                  <a:schemeClr val="bg1"/>
+                </a:solidFill>
+              </a:rPr>
+              <a:t>unmaximize</a:t>
+            </a:r>
+            <a:r>
+              <a:rPr lang="pt-BR" dirty="0" smtClean="0">
+                <a:solidFill>
+                  <a:schemeClr val="bg1"/>
+                </a:solidFill>
+              </a:rPr>
+              <a:t>, move, zoom</a:t>
+            </a:r>
+            <a:endParaRPr lang="pt-BR" dirty="0">
+              <a:solidFill>
+                <a:schemeClr val="bg1"/>
+              </a:solidFill>
+            </a:endParaRPr>
+          </a:p>
+        </p:txBody>
+      </p:sp>
+      <p:pic>
+        <p:nvPicPr>
+          <p:cNvPr id="2050" name="Picture 2" descr="C:\Users\CRA-DTI-02\Desktop\3qwe.fw.png"/>
+          <p:cNvPicPr>
+            <a:picLocks noChangeAspect="1" noChangeArrowheads="1"/>
+          </p:cNvPicPr>
+          <p:nvPr/>
+        </p:nvPicPr>
+        <p:blipFill>
+          <a:blip r:embed="rId2">
+            <a:extLst>
+              <a:ext uri="{28A0092B-C50C-407E-A947-70E740481C1C}">
+                <a14:useLocalDpi xmlns:a14="http://schemas.microsoft.com/office/drawing/2010/main" val="0"/>
+              </a:ext>
+            </a:extLst>
+          </a:blip>
+          <a:srcRect/>
+          <a:stretch>
+            <a:fillRect/>
+          </a:stretch>
+        </p:blipFill>
+        <p:spPr bwMode="auto">
+          <a:xfrm>
+            <a:off x="1351756" y="3858436"/>
+            <a:ext cx="6440488" cy="1435100"/>
+          </a:xfrm>
+          <a:prstGeom prst="rect">
+            <a:avLst/>
+          </a:prstGeom>
+          <a:noFill/>
+          <a:extLst>
+            <a:ext uri="{909E8E84-426E-40DD-AFC4-6F175D3DCCD1}">
+              <a14:hiddenFill xmlns:a14="http://schemas.microsoft.com/office/drawing/2010/main">
+                <a:solidFill>
+                  <a:srgbClr val="FFFFFF"/>
+                </a:solidFill>
+              </a14:hiddenFill>
+            </a:ext>
+          </a:extLst>
+        </p:spPr>
+      </p:pic>
+    </p:spTree>
+    <p:extLst>
+      <p:ext uri="{BB962C8B-B14F-4D97-AF65-F5344CB8AC3E}">
+        <p14:creationId xmlns:p14="http://schemas.microsoft.com/office/powerpoint/2010/main" val="3526825308"/>
+      </p:ext>
+    </p:extLst>
+  </p:cSld>
+  <p:clrMapOvr>
+    <a:masterClrMapping/>
+  </p:clrMapOvr>
+  <mc:AlternateContent xmlns:mc="http://schemas.openxmlformats.org/markup-compatibility/2006" xmlns:p14="http://schemas.microsoft.com/office/powerpoint/2010/main">
+    <mc:Choice Requires="p14">
+      <p:transition spd="slow" p14:dur="1500">
+        <p14:honeycomb/>
+      </p:transition>
+    </mc:Choice>
+    <mc:Fallback xmlns="">
+      <p:transition spd="slow">
+        <p:fade/>
+      </p:transition>
+    </mc:Fallback>
+  </mc:AlternateContent>
+  <p:timing>
+    <p:tnLst>
+      <p:par>
+        <p:cTn id="1" dur="indefinite" restart="never" nodeType="tmRoot"/>
+      </p:par>
+    </p:tnLst>
+  </p:timing>
+</p:sld>
+</file>
+
+<file path=ppt/slides/slide34.xml><?xml version="1.0" encoding="utf-8"?>
+<p:sld xmlns:a="http://schemas.openxmlformats.org/drawingml/2006/main" xmlns:r="http://schemas.openxmlformats.org/officeDocument/2006/relationships" xmlns:p="http://schemas.openxmlformats.org/presentationml/2006/main">
+  <p:cSld>
+    <p:spTree>
+      <p:nvGrpSpPr>
+        <p:cNvPr id="1" name=""/>
+        <p:cNvGrpSpPr/>
+        <p:nvPr/>
+      </p:nvGrpSpPr>
+      <p:grpSpPr>
+        <a:xfrm>
+          <a:off x="0" y="0"/>
+          <a:ext cx="0" cy="0"/>
+          <a:chOff x="0" y="0"/>
+          <a:chExt cx="0" cy="0"/>
+        </a:xfrm>
+      </p:grpSpPr>
+      <p:sp>
+        <p:nvSpPr>
+          <p:cNvPr id="2" name="Título 1"/>
+          <p:cNvSpPr>
+            <a:spLocks noGrp="1"/>
+          </p:cNvSpPr>
+          <p:nvPr>
+            <p:ph type="title"/>
+          </p:nvPr>
+        </p:nvSpPr>
+        <p:spPr/>
+        <p:txBody>
+          <a:bodyPr/>
+          <a:lstStyle/>
+          <a:p>
+            <a:r>
+              <a:rPr lang="pt-BR" dirty="0" err="1" smtClean="0">
+                <a:solidFill>
+                  <a:schemeClr val="bg1"/>
+                </a:solidFill>
+              </a:rPr>
+              <a:t>Window</a:t>
+            </a:r>
+            <a:r>
+              <a:rPr lang="pt-BR" dirty="0" smtClean="0">
+                <a:solidFill>
+                  <a:schemeClr val="bg1"/>
+                </a:solidFill>
+              </a:rPr>
+              <a:t> </a:t>
+            </a:r>
+            <a:r>
+              <a:rPr lang="pt-BR" dirty="0" err="1" smtClean="0">
+                <a:solidFill>
+                  <a:schemeClr val="bg1"/>
+                </a:solidFill>
+              </a:rPr>
+              <a:t>operations</a:t>
+            </a:r>
+            <a:endParaRPr lang="pt-BR" dirty="0">
+              <a:solidFill>
+                <a:schemeClr val="bg1"/>
+              </a:solidFill>
+            </a:endParaRPr>
+          </a:p>
+        </p:txBody>
+      </p:sp>
+      <p:sp>
+        <p:nvSpPr>
+          <p:cNvPr id="3" name="Espaço Reservado para Conteúdo 2"/>
+          <p:cNvSpPr>
+            <a:spLocks noGrp="1"/>
+          </p:cNvSpPr>
+          <p:nvPr>
+            <p:ph idx="1"/>
+          </p:nvPr>
+        </p:nvSpPr>
+        <p:spPr/>
+        <p:txBody>
+          <a:bodyPr/>
+          <a:lstStyle/>
+          <a:p>
+            <a:r>
+              <a:rPr lang="pt-BR" dirty="0" smtClean="0">
+                <a:solidFill>
+                  <a:schemeClr val="bg1"/>
+                </a:solidFill>
+              </a:rPr>
+              <a:t>show(), </a:t>
+            </a:r>
+            <a:r>
+              <a:rPr lang="pt-BR" dirty="0" err="1" smtClean="0">
+                <a:solidFill>
+                  <a:schemeClr val="bg1"/>
+                </a:solidFill>
+              </a:rPr>
+              <a:t>hide</a:t>
+            </a:r>
+            <a:r>
+              <a:rPr lang="pt-BR" dirty="0" smtClean="0">
+                <a:solidFill>
+                  <a:schemeClr val="bg1"/>
+                </a:solidFill>
+              </a:rPr>
+              <a:t>(), close([force]), </a:t>
+            </a:r>
+            <a:r>
+              <a:rPr lang="pt-BR" dirty="0" err="1" smtClean="0">
+                <a:solidFill>
+                  <a:schemeClr val="bg1"/>
+                </a:solidFill>
+              </a:rPr>
+              <a:t>focus</a:t>
+            </a:r>
+            <a:r>
+              <a:rPr lang="pt-BR" dirty="0" smtClean="0">
+                <a:solidFill>
+                  <a:schemeClr val="bg1"/>
+                </a:solidFill>
+              </a:rPr>
+              <a:t>(), </a:t>
+            </a:r>
+            <a:r>
+              <a:rPr lang="pt-BR" dirty="0" err="1" smtClean="0">
+                <a:solidFill>
+                  <a:schemeClr val="bg1"/>
+                </a:solidFill>
+              </a:rPr>
+              <a:t>blur</a:t>
+            </a:r>
+            <a:r>
+              <a:rPr lang="pt-BR" dirty="0" smtClean="0">
+                <a:solidFill>
+                  <a:schemeClr val="bg1"/>
+                </a:solidFill>
+              </a:rPr>
+              <a:t>(), </a:t>
+            </a:r>
+            <a:r>
+              <a:rPr lang="pt-BR" dirty="0" err="1" smtClean="0">
+                <a:solidFill>
+                  <a:schemeClr val="bg1"/>
+                </a:solidFill>
+              </a:rPr>
+              <a:t>moveTo</a:t>
+            </a:r>
+            <a:r>
+              <a:rPr lang="pt-BR" dirty="0" smtClean="0">
+                <a:solidFill>
+                  <a:schemeClr val="bg1"/>
+                </a:solidFill>
+              </a:rPr>
+              <a:t>(</a:t>
+            </a:r>
+            <a:r>
+              <a:rPr lang="pt-BR" dirty="0" err="1" smtClean="0">
+                <a:solidFill>
+                  <a:schemeClr val="bg1"/>
+                </a:solidFill>
+              </a:rPr>
+              <a:t>x,y</a:t>
+            </a:r>
+            <a:r>
+              <a:rPr lang="pt-BR" dirty="0" smtClean="0">
+                <a:solidFill>
+                  <a:schemeClr val="bg1"/>
+                </a:solidFill>
+              </a:rPr>
+              <a:t>), </a:t>
+            </a:r>
+            <a:r>
+              <a:rPr lang="pt-BR" dirty="0" err="1" smtClean="0">
+                <a:solidFill>
+                  <a:schemeClr val="bg1"/>
+                </a:solidFill>
+              </a:rPr>
+              <a:t>moveBy</a:t>
+            </a:r>
+            <a:r>
+              <a:rPr lang="pt-BR" dirty="0" smtClean="0">
+                <a:solidFill>
+                  <a:schemeClr val="bg1"/>
+                </a:solidFill>
+              </a:rPr>
+              <a:t>(</a:t>
+            </a:r>
+            <a:r>
+              <a:rPr lang="pt-BR" dirty="0" err="1" smtClean="0">
+                <a:solidFill>
+                  <a:schemeClr val="bg1"/>
+                </a:solidFill>
+              </a:rPr>
+              <a:t>x,y</a:t>
+            </a:r>
+            <a:r>
+              <a:rPr lang="pt-BR" dirty="0" smtClean="0">
+                <a:solidFill>
+                  <a:schemeClr val="bg1"/>
+                </a:solidFill>
+              </a:rPr>
+              <a:t>), </a:t>
+            </a:r>
+            <a:r>
+              <a:rPr lang="pt-BR" dirty="0" err="1" smtClean="0">
+                <a:solidFill>
+                  <a:schemeClr val="bg1"/>
+                </a:solidFill>
+              </a:rPr>
+              <a:t>resizeTo</a:t>
+            </a:r>
+            <a:r>
+              <a:rPr lang="pt-BR" dirty="0" smtClean="0">
+                <a:solidFill>
+                  <a:schemeClr val="bg1"/>
+                </a:solidFill>
+              </a:rPr>
+              <a:t>(</a:t>
+            </a:r>
+            <a:r>
+              <a:rPr lang="pt-BR" dirty="0" err="1" smtClean="0">
+                <a:solidFill>
+                  <a:schemeClr val="bg1"/>
+                </a:solidFill>
+              </a:rPr>
+              <a:t>width</a:t>
+            </a:r>
+            <a:r>
+              <a:rPr lang="pt-BR" dirty="0" smtClean="0">
+                <a:solidFill>
+                  <a:schemeClr val="bg1"/>
+                </a:solidFill>
+              </a:rPr>
+              <a:t>, </a:t>
+            </a:r>
+            <a:r>
+              <a:rPr lang="pt-BR" dirty="0" err="1" smtClean="0">
+                <a:solidFill>
+                  <a:schemeClr val="bg1"/>
+                </a:solidFill>
+              </a:rPr>
+              <a:t>heigth</a:t>
+            </a:r>
+            <a:r>
+              <a:rPr lang="pt-BR" dirty="0" smtClean="0">
+                <a:solidFill>
+                  <a:schemeClr val="bg1"/>
+                </a:solidFill>
+              </a:rPr>
+              <a:t>), maximize(), minimize(), </a:t>
+            </a:r>
+            <a:r>
+              <a:rPr lang="pt-BR" dirty="0" err="1" smtClean="0">
+                <a:solidFill>
+                  <a:schemeClr val="bg1"/>
+                </a:solidFill>
+              </a:rPr>
+              <a:t>restore</a:t>
+            </a:r>
+            <a:r>
+              <a:rPr lang="pt-BR" dirty="0" smtClean="0">
+                <a:solidFill>
+                  <a:schemeClr val="bg1"/>
+                </a:solidFill>
+              </a:rPr>
+              <a:t>()</a:t>
+            </a:r>
+            <a:endParaRPr lang="pt-BR" dirty="0">
+              <a:solidFill>
+                <a:schemeClr val="bg1"/>
+              </a:solidFill>
+            </a:endParaRPr>
+          </a:p>
+        </p:txBody>
+      </p:sp>
+      <p:pic>
+        <p:nvPicPr>
+          <p:cNvPr id="3074" name="Picture 2" descr="C:\Users\CRA-DTI-02\Desktop\Sem título-4.fw.png"/>
+          <p:cNvPicPr>
+            <a:picLocks noChangeAspect="1" noChangeArrowheads="1"/>
+          </p:cNvPicPr>
+          <p:nvPr/>
+        </p:nvPicPr>
+        <p:blipFill>
+          <a:blip r:embed="rId2">
+            <a:extLst>
+              <a:ext uri="{28A0092B-C50C-407E-A947-70E740481C1C}">
+                <a14:useLocalDpi xmlns:a14="http://schemas.microsoft.com/office/drawing/2010/main" val="0"/>
+              </a:ext>
+            </a:extLst>
+          </a:blip>
+          <a:srcRect/>
+          <a:stretch>
+            <a:fillRect/>
+          </a:stretch>
+        </p:blipFill>
+        <p:spPr bwMode="auto">
+          <a:xfrm>
+            <a:off x="2113757" y="3620864"/>
+            <a:ext cx="4916487" cy="2184400"/>
+          </a:xfrm>
+          <a:prstGeom prst="rect">
+            <a:avLst/>
+          </a:prstGeom>
+          <a:noFill/>
+          <a:extLst>
+            <a:ext uri="{909E8E84-426E-40DD-AFC4-6F175D3DCCD1}">
+              <a14:hiddenFill xmlns:a14="http://schemas.microsoft.com/office/drawing/2010/main">
+                <a:solidFill>
+                  <a:srgbClr val="FFFFFF"/>
+                </a:solidFill>
+              </a14:hiddenFill>
+            </a:ext>
+          </a:extLst>
+        </p:spPr>
+      </p:pic>
+    </p:spTree>
+    <p:extLst>
+      <p:ext uri="{BB962C8B-B14F-4D97-AF65-F5344CB8AC3E}">
+        <p14:creationId xmlns:p14="http://schemas.microsoft.com/office/powerpoint/2010/main" val="2271152952"/>
+      </p:ext>
+    </p:extLst>
+  </p:cSld>
+  <p:clrMapOvr>
+    <a:masterClrMapping/>
+  </p:clrMapOvr>
+  <mc:AlternateContent xmlns:mc="http://schemas.openxmlformats.org/markup-compatibility/2006" xmlns:p14="http://schemas.microsoft.com/office/powerpoint/2010/main">
+    <mc:Choice Requires="p14">
+      <p:transition spd="slow" p14:dur="1500">
+        <p14:honeycomb/>
+      </p:transition>
+    </mc:Choice>
+    <mc:Fallback xmlns="">
+      <p:transition spd="slow">
+        <p:fade/>
+      </p:transition>
+    </mc:Fallback>
+  </mc:AlternateContent>
+  <p:timing>
+    <p:tnLst>
+      <p:par>
+        <p:cTn id="1" dur="indefinite" restart="never" nodeType="tmRoot"/>
+      </p:par>
+    </p:tnLst>
+  </p:timing>
+</p:sld>
+</file>
+
+<file path=ppt/slides/slide35.xml><?xml version="1.0" encoding="utf-8"?>
+<p:sld xmlns:a="http://schemas.openxmlformats.org/drawingml/2006/main" xmlns:r="http://schemas.openxmlformats.org/officeDocument/2006/relationships" xmlns:p="http://schemas.openxmlformats.org/presentationml/2006/main">
+  <p:cSld>
+    <p:spTree>
+      <p:nvGrpSpPr>
+        <p:cNvPr id="1" name=""/>
+        <p:cNvGrpSpPr/>
+        <p:nvPr/>
+      </p:nvGrpSpPr>
+      <p:grpSpPr>
+        <a:xfrm>
+          <a:off x="0" y="0"/>
+          <a:ext cx="0" cy="0"/>
+          <a:chOff x="0" y="0"/>
+          <a:chExt cx="0" cy="0"/>
+        </a:xfrm>
+      </p:grpSpPr>
+      <p:sp>
+        <p:nvSpPr>
+          <p:cNvPr id="2" name="Título 1"/>
+          <p:cNvSpPr>
+            <a:spLocks noGrp="1"/>
+          </p:cNvSpPr>
+          <p:nvPr>
+            <p:ph type="title"/>
+          </p:nvPr>
+        </p:nvSpPr>
+        <p:spPr/>
+        <p:txBody>
+          <a:bodyPr/>
+          <a:lstStyle/>
+          <a:p>
+            <a:r>
+              <a:rPr lang="pt-BR" dirty="0" smtClean="0">
+                <a:solidFill>
+                  <a:schemeClr val="bg1"/>
+                </a:solidFill>
+              </a:rPr>
+              <a:t>Menu</a:t>
+            </a:r>
+            <a:endParaRPr lang="pt-BR" dirty="0">
+              <a:solidFill>
+                <a:schemeClr val="bg1"/>
+              </a:solidFill>
+            </a:endParaRPr>
+          </a:p>
+        </p:txBody>
+      </p:sp>
+      <p:sp>
+        <p:nvSpPr>
+          <p:cNvPr id="3" name="Espaço Reservado para Conteúdo 2"/>
+          <p:cNvSpPr>
+            <a:spLocks noGrp="1"/>
+          </p:cNvSpPr>
+          <p:nvPr>
+            <p:ph idx="1"/>
+          </p:nvPr>
+        </p:nvSpPr>
+        <p:spPr/>
+        <p:txBody>
+          <a:bodyPr/>
+          <a:lstStyle/>
+          <a:p>
+            <a:endParaRPr lang="pt-BR" dirty="0"/>
+          </a:p>
+        </p:txBody>
+      </p:sp>
+      <p:pic>
+        <p:nvPicPr>
+          <p:cNvPr id="5122" name="Picture 2" descr="C:\Users\CRA-DTI-02\Desktop\Sem título-6.fw.png"/>
+          <p:cNvPicPr>
+            <a:picLocks noChangeAspect="1" noChangeArrowheads="1"/>
+          </p:cNvPicPr>
+          <p:nvPr/>
+        </p:nvPicPr>
+        <p:blipFill>
+          <a:blip r:embed="rId2">
+            <a:extLst>
+              <a:ext uri="{28A0092B-C50C-407E-A947-70E740481C1C}">
+                <a14:useLocalDpi xmlns:a14="http://schemas.microsoft.com/office/drawing/2010/main" val="0"/>
+              </a:ext>
+            </a:extLst>
+          </a:blip>
+          <a:srcRect/>
+          <a:stretch>
+            <a:fillRect/>
+          </a:stretch>
+        </p:blipFill>
+        <p:spPr bwMode="auto">
+          <a:xfrm>
+            <a:off x="1143000" y="1700808"/>
+            <a:ext cx="6858001" cy="4381501"/>
+          </a:xfrm>
+          <a:prstGeom prst="rect">
+            <a:avLst/>
+          </a:prstGeom>
+          <a:noFill/>
+          <a:extLst>
+            <a:ext uri="{909E8E84-426E-40DD-AFC4-6F175D3DCCD1}">
+              <a14:hiddenFill xmlns:a14="http://schemas.microsoft.com/office/drawing/2010/main">
+                <a:solidFill>
+                  <a:srgbClr val="FFFFFF"/>
+                </a:solidFill>
+              </a14:hiddenFill>
+            </a:ext>
+          </a:extLst>
+        </p:spPr>
+      </p:pic>
+    </p:spTree>
+    <p:extLst>
+      <p:ext uri="{BB962C8B-B14F-4D97-AF65-F5344CB8AC3E}">
+        <p14:creationId xmlns:p14="http://schemas.microsoft.com/office/powerpoint/2010/main" val="40511000"/>
+      </p:ext>
+    </p:extLst>
+  </p:cSld>
+  <p:clrMapOvr>
+    <a:masterClrMapping/>
+  </p:clrMapOvr>
+  <mc:AlternateContent xmlns:mc="http://schemas.openxmlformats.org/markup-compatibility/2006" xmlns:p14="http://schemas.microsoft.com/office/powerpoint/2010/main">
+    <mc:Choice Requires="p14">
+      <p:transition spd="slow" p14:dur="1500">
+        <p14:honeycomb/>
+      </p:transition>
+    </mc:Choice>
+    <mc:Fallback xmlns="">
+      <p:transition spd="slow">
+        <p:fade/>
+      </p:transition>
+    </mc:Fallback>
+  </mc:AlternateContent>
+  <p:timing>
+    <p:tnLst>
+      <p:par>
+        <p:cTn id="1" dur="indefinite" restart="never" nodeType="tmRoot"/>
+      </p:par>
+    </p:tnLst>
+  </p:timing>
+</p:sld>
+</file>
+
+<file path=ppt/slides/slide36.xml><?xml version="1.0" encoding="utf-8"?>
+<p:sld xmlns:a="http://schemas.openxmlformats.org/drawingml/2006/main" xmlns:r="http://schemas.openxmlformats.org/officeDocument/2006/relationships" xmlns:p="http://schemas.openxmlformats.org/presentationml/2006/main">
+  <p:cSld>
+    <p:spTree>
+      <p:nvGrpSpPr>
+        <p:cNvPr id="1" name=""/>
+        <p:cNvGrpSpPr/>
+        <p:nvPr/>
+      </p:nvGrpSpPr>
+      <p:grpSpPr>
+        <a:xfrm>
+          <a:off x="0" y="0"/>
+          <a:ext cx="0" cy="0"/>
+          <a:chOff x="0" y="0"/>
+          <a:chExt cx="0" cy="0"/>
+        </a:xfrm>
+      </p:grpSpPr>
+      <p:sp>
+        <p:nvSpPr>
+          <p:cNvPr id="2" name="Título 1"/>
+          <p:cNvSpPr>
+            <a:spLocks noGrp="1"/>
+          </p:cNvSpPr>
+          <p:nvPr>
+            <p:ph type="title"/>
+          </p:nvPr>
+        </p:nvSpPr>
+        <p:spPr/>
+        <p:txBody>
+          <a:bodyPr/>
+          <a:lstStyle/>
+          <a:p>
+            <a:r>
+              <a:rPr lang="pt-BR" dirty="0" smtClean="0">
+                <a:solidFill>
+                  <a:schemeClr val="bg1"/>
+                </a:solidFill>
+              </a:rPr>
+              <a:t>Menu</a:t>
+            </a:r>
+            <a:endParaRPr lang="pt-BR" dirty="0">
+              <a:solidFill>
+                <a:schemeClr val="bg1"/>
+              </a:solidFill>
+            </a:endParaRPr>
+          </a:p>
+        </p:txBody>
+      </p:sp>
+      <p:sp>
+        <p:nvSpPr>
+          <p:cNvPr id="3" name="Espaço Reservado para Conteúdo 2"/>
+          <p:cNvSpPr>
+            <a:spLocks noGrp="1"/>
+          </p:cNvSpPr>
+          <p:nvPr>
+            <p:ph idx="1"/>
+          </p:nvPr>
+        </p:nvSpPr>
+        <p:spPr/>
+        <p:txBody>
+          <a:bodyPr/>
+          <a:lstStyle/>
+          <a:p>
+            <a:r>
+              <a:rPr lang="pt-BR" dirty="0" smtClean="0">
+                <a:solidFill>
+                  <a:schemeClr val="bg1"/>
+                </a:solidFill>
+              </a:rPr>
+              <a:t>Mostrando com o botão direito:</a:t>
+            </a:r>
+          </a:p>
+          <a:p>
+            <a:endParaRPr lang="pt-BR" dirty="0">
+              <a:solidFill>
+                <a:schemeClr val="bg1"/>
+              </a:solidFill>
+            </a:endParaRPr>
+          </a:p>
+          <a:p>
+            <a:endParaRPr lang="pt-BR" dirty="0" smtClean="0">
+              <a:solidFill>
+                <a:schemeClr val="bg1"/>
+              </a:solidFill>
+            </a:endParaRPr>
+          </a:p>
+          <a:p>
+            <a:endParaRPr lang="pt-BR" dirty="0">
+              <a:solidFill>
+                <a:schemeClr val="bg1"/>
+              </a:solidFill>
+            </a:endParaRPr>
+          </a:p>
+          <a:p>
+            <a:r>
+              <a:rPr lang="pt-BR" dirty="0" smtClean="0">
+                <a:solidFill>
+                  <a:schemeClr val="bg1"/>
+                </a:solidFill>
+              </a:rPr>
+              <a:t>Evento click</a:t>
+            </a:r>
+          </a:p>
+        </p:txBody>
+      </p:sp>
+      <p:pic>
+        <p:nvPicPr>
+          <p:cNvPr id="6146" name="Picture 2" descr="C:\Users\CRA-DTI-02\Desktop\bd.fw.png"/>
+          <p:cNvPicPr>
+            <a:picLocks noChangeAspect="1" noChangeArrowheads="1"/>
+          </p:cNvPicPr>
+          <p:nvPr/>
+        </p:nvPicPr>
+        <p:blipFill>
+          <a:blip r:embed="rId2">
+            <a:extLst>
+              <a:ext uri="{28A0092B-C50C-407E-A947-70E740481C1C}">
+                <a14:useLocalDpi xmlns:a14="http://schemas.microsoft.com/office/drawing/2010/main" val="0"/>
+              </a:ext>
+            </a:extLst>
+          </a:blip>
+          <a:srcRect/>
+          <a:stretch>
+            <a:fillRect/>
+          </a:stretch>
+        </p:blipFill>
+        <p:spPr bwMode="auto">
+          <a:xfrm>
+            <a:off x="600075" y="2204864"/>
+            <a:ext cx="7943850" cy="1571625"/>
+          </a:xfrm>
+          <a:prstGeom prst="rect">
+            <a:avLst/>
+          </a:prstGeom>
+          <a:noFill/>
+          <a:extLst>
+            <a:ext uri="{909E8E84-426E-40DD-AFC4-6F175D3DCCD1}">
+              <a14:hiddenFill xmlns:a14="http://schemas.microsoft.com/office/drawing/2010/main">
+                <a:solidFill>
+                  <a:srgbClr val="FFFFFF"/>
+                </a:solidFill>
+              </a14:hiddenFill>
+            </a:ext>
+          </a:extLst>
+        </p:spPr>
+      </p:pic>
+      <p:pic>
+        <p:nvPicPr>
+          <p:cNvPr id="6147" name="Picture 3" descr="C:\Users\CRA-DTI-02\Desktop\Sem título-8.fw.png"/>
+          <p:cNvPicPr>
+            <a:picLocks noChangeAspect="1" noChangeArrowheads="1"/>
+          </p:cNvPicPr>
+          <p:nvPr/>
+        </p:nvPicPr>
+        <p:blipFill>
+          <a:blip r:embed="rId3">
+            <a:extLst>
+              <a:ext uri="{28A0092B-C50C-407E-A947-70E740481C1C}">
+                <a14:useLocalDpi xmlns:a14="http://schemas.microsoft.com/office/drawing/2010/main" val="0"/>
+              </a:ext>
+            </a:extLst>
+          </a:blip>
+          <a:srcRect/>
+          <a:stretch>
+            <a:fillRect/>
+          </a:stretch>
+        </p:blipFill>
+        <p:spPr bwMode="auto">
+          <a:xfrm>
+            <a:off x="1682511" y="4532838"/>
+            <a:ext cx="5487988" cy="2133600"/>
+          </a:xfrm>
+          <a:prstGeom prst="rect">
+            <a:avLst/>
+          </a:prstGeom>
+          <a:noFill/>
+          <a:extLst>
+            <a:ext uri="{909E8E84-426E-40DD-AFC4-6F175D3DCCD1}">
+              <a14:hiddenFill xmlns:a14="http://schemas.microsoft.com/office/drawing/2010/main">
+                <a:solidFill>
+                  <a:srgbClr val="FFFFFF"/>
+                </a:solidFill>
+              </a14:hiddenFill>
+            </a:ext>
+          </a:extLst>
+        </p:spPr>
+      </p:pic>
+    </p:spTree>
+    <p:extLst>
+      <p:ext uri="{BB962C8B-B14F-4D97-AF65-F5344CB8AC3E}">
+        <p14:creationId xmlns:p14="http://schemas.microsoft.com/office/powerpoint/2010/main" val="282444104"/>
+      </p:ext>
+    </p:extLst>
+  </p:cSld>
+  <p:clrMapOvr>
+    <a:masterClrMapping/>
+  </p:clrMapOvr>
+  <mc:AlternateContent xmlns:mc="http://schemas.openxmlformats.org/markup-compatibility/2006" xmlns:p14="http://schemas.microsoft.com/office/powerpoint/2010/main">
+    <mc:Choice Requires="p14">
+      <p:transition spd="slow" p14:dur="1500">
+        <p14:honeycomb/>
+      </p:transition>
+    </mc:Choice>
+    <mc:Fallback xmlns="">
+      <p:transition spd="slow">
+        <p:fade/>
+      </p:transition>
+    </mc:Fallback>
+  </mc:AlternateContent>
+  <p:timing>
+    <p:tnLst>
+      <p:par>
+        <p:cTn id="1" dur="indefinite" restart="never" nodeType="tmRoot"/>
+      </p:par>
+    </p:tnLst>
+  </p:timing>
+</p:sld>
+</file>
+
+<file path=ppt/slides/slide37.xml><?xml version="1.0" encoding="utf-8"?>
+<p:sld xmlns:a="http://schemas.openxmlformats.org/drawingml/2006/main" xmlns:r="http://schemas.openxmlformats.org/officeDocument/2006/relationships" xmlns:p="http://schemas.openxmlformats.org/presentationml/2006/main">
+  <p:cSld>
+    <p:spTree>
+      <p:nvGrpSpPr>
+        <p:cNvPr id="1" name=""/>
+        <p:cNvGrpSpPr/>
+        <p:nvPr/>
+      </p:nvGrpSpPr>
+      <p:grpSpPr>
+        <a:xfrm>
+          <a:off x="0" y="0"/>
+          <a:ext cx="0" cy="0"/>
+          <a:chOff x="0" y="0"/>
+          <a:chExt cx="0" cy="0"/>
+        </a:xfrm>
+      </p:grpSpPr>
+      <p:sp>
+        <p:nvSpPr>
+          <p:cNvPr id="2" name="Título 1"/>
+          <p:cNvSpPr>
+            <a:spLocks noGrp="1"/>
+          </p:cNvSpPr>
+          <p:nvPr>
+            <p:ph type="title"/>
+          </p:nvPr>
+        </p:nvSpPr>
+        <p:spPr/>
+        <p:txBody>
+          <a:bodyPr/>
+          <a:lstStyle/>
+          <a:p>
+            <a:r>
+              <a:rPr lang="pt-BR" dirty="0" smtClean="0">
+                <a:solidFill>
+                  <a:schemeClr val="bg1"/>
+                </a:solidFill>
+              </a:rPr>
+              <a:t>Menu com ícones</a:t>
+            </a:r>
+            <a:endParaRPr lang="pt-BR" dirty="0">
+              <a:solidFill>
+                <a:schemeClr val="bg1"/>
+              </a:solidFill>
+            </a:endParaRPr>
+          </a:p>
+        </p:txBody>
+      </p:sp>
+      <p:sp>
+        <p:nvSpPr>
+          <p:cNvPr id="3" name="Espaço Reservado para Conteúdo 2"/>
+          <p:cNvSpPr>
+            <a:spLocks noGrp="1"/>
+          </p:cNvSpPr>
+          <p:nvPr>
+            <p:ph idx="1"/>
+          </p:nvPr>
+        </p:nvSpPr>
+        <p:spPr/>
+        <p:txBody>
+          <a:bodyPr/>
+          <a:lstStyle/>
+          <a:p>
+            <a:r>
+              <a:rPr lang="pt-BR" dirty="0" smtClean="0">
+                <a:solidFill>
+                  <a:schemeClr val="bg1"/>
+                </a:solidFill>
+              </a:rPr>
+              <a:t>Crie uma pasta com o nome </a:t>
+            </a:r>
+            <a:r>
+              <a:rPr lang="pt-BR" dirty="0" err="1" smtClean="0">
+                <a:solidFill>
+                  <a:schemeClr val="bg1"/>
+                </a:solidFill>
+              </a:rPr>
+              <a:t>img</a:t>
+            </a:r>
+            <a:r>
+              <a:rPr lang="pt-BR" dirty="0" smtClean="0">
+                <a:solidFill>
+                  <a:schemeClr val="bg1"/>
+                </a:solidFill>
+              </a:rPr>
+              <a:t> e baixe uma imagem .</a:t>
+            </a:r>
+            <a:r>
+              <a:rPr lang="pt-BR" dirty="0" err="1" smtClean="0">
+                <a:solidFill>
+                  <a:schemeClr val="bg1"/>
+                </a:solidFill>
+              </a:rPr>
+              <a:t>png</a:t>
+            </a:r>
+            <a:r>
+              <a:rPr lang="pt-BR" dirty="0" smtClean="0">
+                <a:solidFill>
+                  <a:schemeClr val="bg1"/>
+                </a:solidFill>
+              </a:rPr>
+              <a:t> de 16px x 16px nela com o nome icon.png</a:t>
+            </a:r>
+            <a:endParaRPr lang="pt-BR" dirty="0">
+              <a:solidFill>
+                <a:schemeClr val="bg1"/>
+              </a:solidFill>
+            </a:endParaRPr>
+          </a:p>
+        </p:txBody>
+      </p:sp>
+      <p:pic>
+        <p:nvPicPr>
+          <p:cNvPr id="7170" name="Picture 2" descr="C:\Users\CRA-DTI-02\Desktop\as.fw.png"/>
+          <p:cNvPicPr>
+            <a:picLocks noChangeAspect="1" noChangeArrowheads="1"/>
+          </p:cNvPicPr>
+          <p:nvPr/>
+        </p:nvPicPr>
+        <p:blipFill>
+          <a:blip r:embed="rId2">
+            <a:extLst>
+              <a:ext uri="{28A0092B-C50C-407E-A947-70E740481C1C}">
+                <a14:useLocalDpi xmlns:a14="http://schemas.microsoft.com/office/drawing/2010/main" val="0"/>
+              </a:ext>
+            </a:extLst>
+          </a:blip>
+          <a:srcRect/>
+          <a:stretch>
+            <a:fillRect/>
+          </a:stretch>
+        </p:blipFill>
+        <p:spPr bwMode="auto">
+          <a:xfrm>
+            <a:off x="1895148" y="3510756"/>
+            <a:ext cx="5360988" cy="2222500"/>
+          </a:xfrm>
+          <a:prstGeom prst="rect">
+            <a:avLst/>
+          </a:prstGeom>
+          <a:noFill/>
+          <a:extLst>
+            <a:ext uri="{909E8E84-426E-40DD-AFC4-6F175D3DCCD1}">
+              <a14:hiddenFill xmlns:a14="http://schemas.microsoft.com/office/drawing/2010/main">
+                <a:solidFill>
+                  <a:srgbClr val="FFFFFF"/>
+                </a:solidFill>
+              </a14:hiddenFill>
+            </a:ext>
+          </a:extLst>
+        </p:spPr>
+      </p:pic>
+    </p:spTree>
+    <p:extLst>
+      <p:ext uri="{BB962C8B-B14F-4D97-AF65-F5344CB8AC3E}">
+        <p14:creationId xmlns:p14="http://schemas.microsoft.com/office/powerpoint/2010/main" val="2199915308"/>
+      </p:ext>
+    </p:extLst>
+  </p:cSld>
+  <p:clrMapOvr>
+    <a:masterClrMapping/>
+  </p:clrMapOvr>
+  <mc:AlternateContent xmlns:mc="http://schemas.openxmlformats.org/markup-compatibility/2006" xmlns:p14="http://schemas.microsoft.com/office/powerpoint/2010/main">
+    <mc:Choice Requires="p14">
+      <p:transition spd="slow" p14:dur="1500">
+        <p14:honeycomb/>
+      </p:transition>
+    </mc:Choice>
+    <mc:Fallback xmlns="">
+      <p:transition spd="slow">
+        <p:fade/>
+      </p:transition>
+    </mc:Fallback>
+  </mc:AlternateContent>
+  <p:timing>
+    <p:tnLst>
+      <p:par>
+        <p:cTn id="1" dur="indefinite" restart="never" nodeType="tmRoot"/>
+      </p:par>
+    </p:tnLst>
+  </p:timing>
 </p:sld>
 </file>
 

</xml_diff>